<commit_message>
slide and readme update with agenda
</commit_message>
<xml_diff>
--- a/slides/oppd-sidemeeting-dublin.pptx
+++ b/slides/oppd-sidemeeting-dublin.pptx
@@ -16,6 +16,7 @@
     <p:sldId id="298" r:id="rId10"/>
     <p:sldId id="299" r:id="rId11"/>
     <p:sldId id="293" r:id="rId12"/>
+    <p:sldId id="301" r:id="rId13"/>
   </p:sldIdLst>
   <p:sldSz cx="12192000" cy="6858000"/>
   <p:notesSz cx="6858000" cy="9144000"/>
@@ -268,7 +269,7 @@
           <a:lstStyle/>
           <a:p>
             <a:fld id="{5A78A427-06D8-CD47-8091-43BCF91BCB61}" type="datetimeFigureOut">
-              <a:t>10/23/24</a:t>
+              <a:t>11/6/24</a:t>
             </a:fld>
             <a:endParaRPr lang="en-US"/>
           </a:p>
@@ -464,7 +465,7 @@
           <a:lstStyle/>
           <a:p>
             <a:fld id="{5A78A427-06D8-CD47-8091-43BCF91BCB61}" type="datetimeFigureOut">
-              <a:t>10/23/24</a:t>
+              <a:t>11/6/24</a:t>
             </a:fld>
             <a:endParaRPr lang="en-US"/>
           </a:p>
@@ -670,7 +671,7 @@
           <a:lstStyle/>
           <a:p>
             <a:fld id="{5A78A427-06D8-CD47-8091-43BCF91BCB61}" type="datetimeFigureOut">
-              <a:t>10/23/24</a:t>
+              <a:t>11/6/24</a:t>
             </a:fld>
             <a:endParaRPr lang="en-US"/>
           </a:p>
@@ -866,7 +867,7 @@
           <a:lstStyle/>
           <a:p>
             <a:fld id="{5A78A427-06D8-CD47-8091-43BCF91BCB61}" type="datetimeFigureOut">
-              <a:t>10/23/24</a:t>
+              <a:t>11/6/24</a:t>
             </a:fld>
             <a:endParaRPr lang="en-US"/>
           </a:p>
@@ -1139,7 +1140,7 @@
           <a:lstStyle/>
           <a:p>
             <a:fld id="{5A78A427-06D8-CD47-8091-43BCF91BCB61}" type="datetimeFigureOut">
-              <a:t>10/23/24</a:t>
+              <a:t>11/6/24</a:t>
             </a:fld>
             <a:endParaRPr lang="en-US"/>
           </a:p>
@@ -1402,7 +1403,7 @@
           <a:lstStyle/>
           <a:p>
             <a:fld id="{5A78A427-06D8-CD47-8091-43BCF91BCB61}" type="datetimeFigureOut">
-              <a:t>10/23/24</a:t>
+              <a:t>11/6/24</a:t>
             </a:fld>
             <a:endParaRPr lang="en-US"/>
           </a:p>
@@ -1812,7 +1813,7 @@
           <a:lstStyle/>
           <a:p>
             <a:fld id="{5A78A427-06D8-CD47-8091-43BCF91BCB61}" type="datetimeFigureOut">
-              <a:t>10/23/24</a:t>
+              <a:t>11/6/24</a:t>
             </a:fld>
             <a:endParaRPr lang="en-US"/>
           </a:p>
@@ -1951,7 +1952,7 @@
           <a:lstStyle/>
           <a:p>
             <a:fld id="{5A78A427-06D8-CD47-8091-43BCF91BCB61}" type="datetimeFigureOut">
-              <a:t>10/23/24</a:t>
+              <a:t>11/6/24</a:t>
             </a:fld>
             <a:endParaRPr lang="en-US"/>
           </a:p>
@@ -2062,7 +2063,7 @@
           <a:lstStyle/>
           <a:p>
             <a:fld id="{5A78A427-06D8-CD47-8091-43BCF91BCB61}" type="datetimeFigureOut">
-              <a:t>10/23/24</a:t>
+              <a:t>11/6/24</a:t>
             </a:fld>
             <a:endParaRPr lang="en-US"/>
           </a:p>
@@ -2371,7 +2372,7 @@
           <a:lstStyle/>
           <a:p>
             <a:fld id="{5A78A427-06D8-CD47-8091-43BCF91BCB61}" type="datetimeFigureOut">
-              <a:t>10/23/24</a:t>
+              <a:t>11/6/24</a:t>
             </a:fld>
             <a:endParaRPr lang="en-US"/>
           </a:p>
@@ -2657,7 +2658,7 @@
           <a:lstStyle/>
           <a:p>
             <a:fld id="{5A78A427-06D8-CD47-8091-43BCF91BCB61}" type="datetimeFigureOut">
-              <a:t>10/23/24</a:t>
+              <a:t>11/6/24</a:t>
             </a:fld>
             <a:endParaRPr lang="en-US"/>
           </a:p>
@@ -2896,7 +2897,7 @@
           </a:lstStyle>
           <a:p>
             <a:fld id="{5A78A427-06D8-CD47-8091-43BCF91BCB61}" type="datetimeFigureOut">
-              <a:t>10/23/24</a:t>
+              <a:t>11/6/24</a:t>
             </a:fld>
             <a:endParaRPr lang="en-US"/>
           </a:p>
@@ -3696,6 +3697,130 @@
 </p:sld>
 </file>
 
+<file path=ppt/slides/slide12.xml><?xml version="1.0" encoding="utf-8"?>
+<p:sld xmlns:a="http://schemas.openxmlformats.org/drawingml/2006/main" xmlns:r="http://schemas.openxmlformats.org/officeDocument/2006/relationships" xmlns:p="http://schemas.openxmlformats.org/presentationml/2006/main">
+  <p:cSld>
+    <p:spTree>
+      <p:nvGrpSpPr>
+        <p:cNvPr id="1" name=""/>
+        <p:cNvGrpSpPr/>
+        <p:nvPr/>
+      </p:nvGrpSpPr>
+      <p:grpSpPr>
+        <a:xfrm>
+          <a:off x="0" y="0"/>
+          <a:ext cx="0" cy="0"/>
+          <a:chOff x="0" y="0"/>
+          <a:chExt cx="0" cy="0"/>
+        </a:xfrm>
+      </p:grpSpPr>
+      <p:sp>
+        <p:nvSpPr>
+          <p:cNvPr id="2" name="Title 1">
+            <a:extLst>
+              <a:ext uri="{FF2B5EF4-FFF2-40B4-BE49-F238E27FC236}">
+                <a16:creationId xmlns:a16="http://schemas.microsoft.com/office/drawing/2014/main" id="{AC73204B-369F-9A30-899D-B2FC3A72E253}"/>
+              </a:ext>
+            </a:extLst>
+          </p:cNvPr>
+          <p:cNvSpPr>
+            <a:spLocks noGrp="1"/>
+          </p:cNvSpPr>
+          <p:nvPr>
+            <p:ph type="title"/>
+          </p:nvPr>
+        </p:nvSpPr>
+        <p:spPr/>
+        <p:txBody>
+          <a:bodyPr/>
+          <a:lstStyle/>
+          <a:p>
+            <a:r>
+              <a:rPr lang="en-US"/>
+              <a:t>What do we want from this?</a:t>
+            </a:r>
+          </a:p>
+        </p:txBody>
+      </p:sp>
+      <p:sp>
+        <p:nvSpPr>
+          <p:cNvPr id="3" name="Content Placeholder 2">
+            <a:extLst>
+              <a:ext uri="{FF2B5EF4-FFF2-40B4-BE49-F238E27FC236}">
+                <a16:creationId xmlns:a16="http://schemas.microsoft.com/office/drawing/2014/main" id="{45E503B6-B0E1-22B5-976A-EAB23DEF674F}"/>
+              </a:ext>
+            </a:extLst>
+          </p:cNvPr>
+          <p:cNvSpPr>
+            <a:spLocks noGrp="1"/>
+          </p:cNvSpPr>
+          <p:nvPr>
+            <p:ph idx="1"/>
+          </p:nvPr>
+        </p:nvSpPr>
+        <p:spPr/>
+        <p:txBody>
+          <a:bodyPr/>
+          <a:lstStyle/>
+          <a:p>
+            <a:pPr marL="514350" indent="-514350">
+              <a:buFont typeface="+mj-lt"/>
+              <a:buAutoNum type="arabicPeriod"/>
+            </a:pPr>
+            <a:r>
+              <a:rPr lang="en-US"/>
+              <a:t>Where should we do this work?</a:t>
+            </a:r>
+          </a:p>
+          <a:p>
+            <a:pPr marL="514350" indent="-514350">
+              <a:buFont typeface="+mj-lt"/>
+              <a:buAutoNum type="arabicPeriod"/>
+            </a:pPr>
+            <a:endParaRPr lang="en-US"/>
+          </a:p>
+          <a:p>
+            <a:pPr marL="514350" indent="-514350">
+              <a:buFont typeface="+mj-lt"/>
+              <a:buAutoNum type="arabicPeriod"/>
+            </a:pPr>
+            <a:r>
+              <a:rPr lang="en-US"/>
+              <a:t>Where should we do following work on performance enhancing functions?  (SMAQ / Sidekick / .. ?)</a:t>
+            </a:r>
+          </a:p>
+          <a:p>
+            <a:pPr marL="514350" indent="-514350">
+              <a:buFont typeface="+mj-lt"/>
+              <a:buAutoNum type="arabicPeriod"/>
+            </a:pPr>
+            <a:endParaRPr lang="en-US"/>
+          </a:p>
+          <a:p>
+            <a:pPr marL="514350" indent="-514350">
+              <a:buFont typeface="+mj-lt"/>
+              <a:buAutoNum type="arabicPeriod"/>
+            </a:pPr>
+            <a:r>
+              <a:rPr lang="en-US"/>
+              <a:t>If time permits: design discussion of OPPD</a:t>
+            </a:r>
+          </a:p>
+        </p:txBody>
+      </p:sp>
+    </p:spTree>
+    <p:extLst>
+      <p:ext uri="{BB962C8B-B14F-4D97-AF65-F5344CB8AC3E}">
+        <p14:creationId xmlns:p14="http://schemas.microsoft.com/office/powerpoint/2010/main" val="2728523166"/>
+      </p:ext>
+    </p:extLst>
+  </p:cSld>
+  <p:clrMapOvr>
+    <a:masterClrMapping/>
+  </p:clrMapOvr>
+</p:sld>
+</file>
+
 <file path=ppt/slides/slide2.xml><?xml version="1.0" encoding="utf-8"?>
 <p:sld xmlns:a="http://schemas.openxmlformats.org/drawingml/2006/main" xmlns:r="http://schemas.openxmlformats.org/officeDocument/2006/relationships" xmlns:p="http://schemas.openxmlformats.org/presentationml/2006/main">
   <p:cSld>
@@ -4723,7 +4848,24 @@
             <a:pPr algn="ctr"/>
             <a:r>
               <a:rPr lang="en-US"/>
-              <a:t>3 signaling options</a:t>
+              <a:t>How could this work?</a:t>
+            </a:r>
+            <a:br>
+              <a:rPr lang="en-US"/>
+            </a:br>
+            <a:br>
+              <a:rPr lang="en-US"/>
+            </a:br>
+            <a:r>
+              <a:rPr lang="en-US" sz="4000"/>
+              <a:t>draft-welzl-panrg-oppd</a:t>
+            </a:r>
+            <a:br>
+              <a:rPr lang="en-US" sz="4000"/>
+            </a:br>
+            <a:r>
+              <a:rPr lang="en-US" sz="4000"/>
+              <a:t>identifies 3 signaling options</a:t>
             </a:r>
             <a:br>
               <a:rPr lang="en-US"/>

</xml_diff>